<commit_message>
debuggen naar juiste file
</commit_message>
<xml_diff>
--- a/_SLIDES/DEEL1/H3/6_math.pptx
+++ b/_SLIDES/DEEL1/H3/6_math.pptx
@@ -5,10 +5,10 @@
     <p:sldMasterId id="2147483672" r:id="rId1"/>
   </p:sldMasterIdLst>
   <p:notesMasterIdLst>
-    <p:notesMasterId r:id="rId25"/>
+    <p:notesMasterId r:id="rId19"/>
   </p:notesMasterIdLst>
   <p:handoutMasterIdLst>
-    <p:handoutMasterId r:id="rId26"/>
+    <p:handoutMasterId r:id="rId20"/>
   </p:handoutMasterIdLst>
   <p:sldIdLst>
     <p:sldId id="281" r:id="rId2"/>
@@ -28,34 +28,28 @@
     <p:sldId id="285" r:id="rId16"/>
     <p:sldId id="286" r:id="rId17"/>
     <p:sldId id="287" r:id="rId18"/>
-    <p:sldId id="293" r:id="rId19"/>
-    <p:sldId id="294" r:id="rId20"/>
-    <p:sldId id="296" r:id="rId21"/>
-    <p:sldId id="297" r:id="rId22"/>
-    <p:sldId id="298" r:id="rId23"/>
-    <p:sldId id="295" r:id="rId24"/>
   </p:sldIdLst>
   <p:sldSz cx="12192000" cy="6858000"/>
   <p:notesSz cx="7099300" cy="10234613"/>
   <p:embeddedFontLst>
     <p:embeddedFont>
       <p:font typeface="Calibri" panose="020F0502020204030204" pitchFamily="34" charset="0"/>
+      <p:regular r:id="rId21"/>
+      <p:bold r:id="rId22"/>
+      <p:italic r:id="rId23"/>
+      <p:boldItalic r:id="rId24"/>
+    </p:embeddedFont>
+    <p:embeddedFont>
+      <p:font typeface="Calibri Light" panose="020F0302020204030204" pitchFamily="34" charset="0"/>
+      <p:regular r:id="rId25"/>
+      <p:italic r:id="rId26"/>
+    </p:embeddedFont>
+    <p:embeddedFont>
+      <p:font typeface="Consolas" panose="020B0609020204030204" pitchFamily="49" charset="0"/>
       <p:regular r:id="rId27"/>
       <p:bold r:id="rId28"/>
       <p:italic r:id="rId29"/>
       <p:boldItalic r:id="rId30"/>
-    </p:embeddedFont>
-    <p:embeddedFont>
-      <p:font typeface="Calibri Light" panose="020F0302020204030204" pitchFamily="34" charset="0"/>
-      <p:regular r:id="rId31"/>
-      <p:italic r:id="rId32"/>
-    </p:embeddedFont>
-    <p:embeddedFont>
-      <p:font typeface="Consolas" panose="020B0609020204030204" pitchFamily="49" charset="0"/>
-      <p:regular r:id="rId33"/>
-      <p:bold r:id="rId34"/>
-      <p:italic r:id="rId35"/>
-      <p:boldItalic r:id="rId36"/>
     </p:embeddedFont>
   </p:embeddedFontLst>
   <p:defaultTextStyle>
@@ -11577,616 +11571,6 @@
 </p:sld>
 </file>
 
-<file path=ppt/slides/slide18.xml><?xml version="1.0" encoding="utf-8"?>
-<p:sld xmlns:a="http://schemas.openxmlformats.org/drawingml/2006/main" xmlns:r="http://schemas.openxmlformats.org/officeDocument/2006/relationships" xmlns:p="http://schemas.openxmlformats.org/presentationml/2006/main">
-  <p:cSld>
-    <p:bg>
-      <p:bgPr>
-        <a:solidFill>
-          <a:schemeClr val="bg1"/>
-        </a:solidFill>
-        <a:effectLst/>
-      </p:bgPr>
-    </p:bg>
-    <p:spTree>
-      <p:nvGrpSpPr>
-        <p:cNvPr id="1" name=""/>
-        <p:cNvGrpSpPr/>
-        <p:nvPr/>
-      </p:nvGrpSpPr>
-      <p:grpSpPr>
-        <a:xfrm>
-          <a:off x="0" y="0"/>
-          <a:ext cx="0" cy="0"/>
-          <a:chOff x="0" y="0"/>
-          <a:chExt cx="0" cy="0"/>
-        </a:xfrm>
-      </p:grpSpPr>
-      <p:pic>
-        <p:nvPicPr>
-          <p:cNvPr id="6" name="Afbeelding 5" descr="Afbeelding met tekening&#10;&#10;Automatisch gegenereerde beschrijving">
-            <a:extLst>
-              <a:ext uri="{FF2B5EF4-FFF2-40B4-BE49-F238E27FC236}">
-                <a16:creationId xmlns:a16="http://schemas.microsoft.com/office/drawing/2014/main" id="{4C1B9409-D13F-41A8-AF8F-D0CFDD57288F}"/>
-              </a:ext>
-            </a:extLst>
-          </p:cNvPr>
-          <p:cNvPicPr>
-            <a:picLocks noChangeAspect="1"/>
-          </p:cNvPicPr>
-          <p:nvPr/>
-        </p:nvPicPr>
-        <p:blipFill rotWithShape="1">
-          <a:blip r:embed="rId2">
-            <a:extLst>
-              <a:ext uri="{28A0092B-C50C-407E-A947-70E740481C1C}">
-                <a14:useLocalDpi xmlns:a14="http://schemas.microsoft.com/office/drawing/2010/main" val="0"/>
-              </a:ext>
-            </a:extLst>
-          </a:blip>
-          <a:srcRect l="3268" r="3399"/>
-          <a:stretch/>
-        </p:blipFill>
-        <p:spPr>
-          <a:xfrm>
-            <a:off x="20" y="10"/>
-            <a:ext cx="12191980" cy="6857990"/>
-          </a:xfrm>
-          <a:prstGeom prst="rect">
-            <a:avLst/>
-          </a:prstGeom>
-        </p:spPr>
-      </p:pic>
-      <p:sp>
-        <p:nvSpPr>
-          <p:cNvPr id="16" name="Freeform 5">
-            <a:extLst>
-              <a:ext uri="{FF2B5EF4-FFF2-40B4-BE49-F238E27FC236}">
-                <a16:creationId xmlns:a16="http://schemas.microsoft.com/office/drawing/2014/main" id="{87CC2527-562A-4F69-B487-4371E5B243E7}"/>
-              </a:ext>
-              <a:ext uri="{C183D7F6-B498-43B3-948B-1728B52AA6E4}">
-                <adec:decorative xmlns:adec="http://schemas.microsoft.com/office/drawing/2017/decorative" val="1"/>
-              </a:ext>
-            </a:extLst>
-          </p:cNvPr>
-          <p:cNvSpPr>
-            <a:spLocks noGrp="1" noRot="1" noChangeAspect="1" noMove="1" noResize="1" noEditPoints="1" noAdjustHandles="1" noChangeArrowheads="1" noChangeShapeType="1" noTextEdit="1"/>
-          </p:cNvSpPr>
-          <p:nvPr>
-            <p:extLst>
-              <p:ext uri="{386F3935-93C4-4BCD-93E2-E3B085C9AB24}">
-                <p16:designElem xmlns:p16="http://schemas.microsoft.com/office/powerpoint/2015/main" val="1"/>
-              </p:ext>
-            </p:extLst>
-          </p:nvPr>
-        </p:nvSpPr>
-        <p:spPr bwMode="grayWhite">
-          <a:xfrm>
-            <a:off x="7488621" y="2277613"/>
-            <a:ext cx="4703379" cy="4580387"/>
-          </a:xfrm>
-          <a:custGeom>
-            <a:avLst/>
-            <a:gdLst>
-              <a:gd name="T0" fmla="*/ 1333 w 1333"/>
-              <a:gd name="T1" fmla="*/ 1031 h 1298"/>
-              <a:gd name="T2" fmla="*/ 1333 w 1333"/>
-              <a:gd name="T3" fmla="*/ 380 h 1298"/>
-              <a:gd name="T4" fmla="*/ 706 w 1333"/>
-              <a:gd name="T5" fmla="*/ 0 h 1298"/>
-              <a:gd name="T6" fmla="*/ 0 w 1333"/>
-              <a:gd name="T7" fmla="*/ 706 h 1298"/>
-              <a:gd name="T8" fmla="*/ 323 w 1333"/>
-              <a:gd name="T9" fmla="*/ 1298 h 1298"/>
-              <a:gd name="T10" fmla="*/ 1090 w 1333"/>
-              <a:gd name="T11" fmla="*/ 1298 h 1298"/>
-              <a:gd name="T12" fmla="*/ 1333 w 1333"/>
-              <a:gd name="T13" fmla="*/ 1031 h 1298"/>
-            </a:gdLst>
-            <a:ahLst/>
-            <a:cxnLst>
-              <a:cxn ang="0">
-                <a:pos x="T0" y="T1"/>
-              </a:cxn>
-              <a:cxn ang="0">
-                <a:pos x="T2" y="T3"/>
-              </a:cxn>
-              <a:cxn ang="0">
-                <a:pos x="T4" y="T5"/>
-              </a:cxn>
-              <a:cxn ang="0">
-                <a:pos x="T6" y="T7"/>
-              </a:cxn>
-              <a:cxn ang="0">
-                <a:pos x="T8" y="T9"/>
-              </a:cxn>
-              <a:cxn ang="0">
-                <a:pos x="T10" y="T11"/>
-              </a:cxn>
-              <a:cxn ang="0">
-                <a:pos x="T12" y="T13"/>
-              </a:cxn>
-            </a:cxnLst>
-            <a:rect l="0" t="0" r="r" b="b"/>
-            <a:pathLst>
-              <a:path w="1333" h="1298">
-                <a:moveTo>
-                  <a:pt x="1333" y="1031"/>
-                </a:moveTo>
-                <a:cubicBezTo>
-                  <a:pt x="1333" y="380"/>
-                  <a:pt x="1333" y="380"/>
-                  <a:pt x="1333" y="380"/>
-                </a:cubicBezTo>
-                <a:cubicBezTo>
-                  <a:pt x="1215" y="154"/>
-                  <a:pt x="979" y="0"/>
-                  <a:pt x="706" y="0"/>
-                </a:cubicBezTo>
-                <a:cubicBezTo>
-                  <a:pt x="317" y="0"/>
-                  <a:pt x="0" y="316"/>
-                  <a:pt x="0" y="706"/>
-                </a:cubicBezTo>
-                <a:cubicBezTo>
-                  <a:pt x="0" y="954"/>
-                  <a:pt x="129" y="1172"/>
-                  <a:pt x="323" y="1298"/>
-                </a:cubicBezTo>
-                <a:cubicBezTo>
-                  <a:pt x="1090" y="1298"/>
-                  <a:pt x="1090" y="1298"/>
-                  <a:pt x="1090" y="1298"/>
-                </a:cubicBezTo>
-                <a:cubicBezTo>
-                  <a:pt x="1193" y="1232"/>
-                  <a:pt x="1276" y="1140"/>
-                  <a:pt x="1333" y="1031"/>
-                </a:cubicBezTo>
-                <a:close/>
-              </a:path>
-            </a:pathLst>
-          </a:custGeom>
-          <a:solidFill>
-            <a:schemeClr val="bg1">
-              <a:alpha val="70000"/>
-            </a:schemeClr>
-          </a:solidFill>
-          <a:ln w="50800" cap="sq" cmpd="dbl">
-            <a:noFill/>
-            <a:miter lim="800000"/>
-          </a:ln>
-          <a:effectLst/>
-        </p:spPr>
-        <p:txBody>
-          <a:bodyPr vert="horz" lIns="91440" tIns="45720" rIns="91440" bIns="45720" rtlCol="0" anchor="t">
-            <a:normAutofit/>
-          </a:bodyPr>
-          <a:lstStyle/>
-          <a:p>
-            <a:pPr algn="ctr">
-              <a:spcAft>
-                <a:spcPts val="1000"/>
-              </a:spcAft>
-              <a:buClr>
-                <a:schemeClr val="tx1"/>
-              </a:buClr>
-              <a:buSzPct val="100000"/>
-              <a:buFont typeface="Arial"/>
-              <a:buNone/>
-            </a:pPr>
-            <a:endParaRPr lang="en-US" sz="1600" cap="all"/>
-          </a:p>
-        </p:txBody>
-      </p:sp>
-      <p:sp>
-        <p:nvSpPr>
-          <p:cNvPr id="2" name="Titel 1">
-            <a:extLst>
-              <a:ext uri="{FF2B5EF4-FFF2-40B4-BE49-F238E27FC236}">
-                <a16:creationId xmlns:a16="http://schemas.microsoft.com/office/drawing/2014/main" id="{A79500E6-69FB-490D-81B4-43C8E6E68464}"/>
-              </a:ext>
-            </a:extLst>
-          </p:cNvPr>
-          <p:cNvSpPr>
-            <a:spLocks noGrp="1"/>
-          </p:cNvSpPr>
-          <p:nvPr>
-            <p:ph type="title"/>
-          </p:nvPr>
-        </p:nvSpPr>
-        <p:spPr>
-          <a:xfrm>
-            <a:off x="8022021" y="3231931"/>
-            <a:ext cx="3852041" cy="1834056"/>
-          </a:xfrm>
-        </p:spPr>
-        <p:txBody>
-          <a:bodyPr vert="horz" lIns="91440" tIns="45720" rIns="91440" bIns="45720" rtlCol="0" anchor="b">
-            <a:normAutofit/>
-          </a:bodyPr>
-          <a:lstStyle/>
-          <a:p>
-            <a:pPr algn="ctr"/>
-            <a:r>
-              <a:rPr lang="en-US" sz="4000"/>
-              <a:t>Debugging</a:t>
-            </a:r>
-          </a:p>
-        </p:txBody>
-      </p:sp>
-      <p:sp>
-        <p:nvSpPr>
-          <p:cNvPr id="4" name="Tijdelijke aanduiding voor dianummer 3">
-            <a:extLst>
-              <a:ext uri="{FF2B5EF4-FFF2-40B4-BE49-F238E27FC236}">
-                <a16:creationId xmlns:a16="http://schemas.microsoft.com/office/drawing/2014/main" id="{A01E2AC5-589C-4B4F-AC3F-CFF295A56CD8}"/>
-              </a:ext>
-            </a:extLst>
-          </p:cNvPr>
-          <p:cNvSpPr>
-            <a:spLocks noGrp="1"/>
-          </p:cNvSpPr>
-          <p:nvPr>
-            <p:ph type="sldNum" sz="quarter" idx="12"/>
-          </p:nvPr>
-        </p:nvSpPr>
-        <p:spPr>
-          <a:xfrm>
-            <a:off x="9765161" y="2640943"/>
-            <a:ext cx="365760" cy="365125"/>
-          </a:xfrm>
-          <a:prstGeom prst="ellipse">
-            <a:avLst/>
-          </a:prstGeom>
-          <a:solidFill>
-            <a:schemeClr val="bg1">
-              <a:alpha val="30000"/>
-            </a:schemeClr>
-          </a:solidFill>
-          <a:ln>
-            <a:solidFill>
-              <a:schemeClr val="tx1">
-                <a:lumMod val="75000"/>
-                <a:lumOff val="25000"/>
-              </a:schemeClr>
-            </a:solidFill>
-          </a:ln>
-        </p:spPr>
-        <p:txBody>
-          <a:bodyPr vert="horz" lIns="91440" tIns="45720" rIns="91440" bIns="45720" rtlCol="0" anchor="ctr">
-            <a:normAutofit fontScale="55000" lnSpcReduction="20000"/>
-          </a:bodyPr>
-          <a:lstStyle/>
-          <a:p>
-            <a:pPr algn="ctr">
-              <a:lnSpc>
-                <a:spcPct val="90000"/>
-              </a:lnSpc>
-              <a:spcAft>
-                <a:spcPts val="600"/>
-              </a:spcAft>
-              <a:defRPr/>
-            </a:pPr>
-            <a:fld id="{E8A62353-F7CD-46ED-8877-B27D0E33FCF8}" type="slidenum">
-              <a:rPr lang="en-US">
-                <a:solidFill>
-                  <a:schemeClr val="tx1"/>
-                </a:solidFill>
-                <a:latin typeface="Calibri" panose="020F0502020204030204"/>
-              </a:rPr>
-              <a:pPr algn="ctr">
-                <a:lnSpc>
-                  <a:spcPct val="90000"/>
-                </a:lnSpc>
-                <a:spcAft>
-                  <a:spcPts val="600"/>
-                </a:spcAft>
-                <a:defRPr/>
-              </a:pPr>
-              <a:t>18</a:t>
-            </a:fld>
-            <a:endParaRPr lang="en-US">
-              <a:solidFill>
-                <a:schemeClr val="tx1"/>
-              </a:solidFill>
-              <a:latin typeface="Calibri" panose="020F0502020204030204"/>
-            </a:endParaRPr>
-          </a:p>
-        </p:txBody>
-      </p:sp>
-      <p:cxnSp>
-        <p:nvCxnSpPr>
-          <p:cNvPr id="18" name="Straight Connector 17">
-            <a:extLst>
-              <a:ext uri="{FF2B5EF4-FFF2-40B4-BE49-F238E27FC236}">
-                <a16:creationId xmlns:a16="http://schemas.microsoft.com/office/drawing/2014/main" id="{BCDAEC91-5BCE-4B55-9CC0-43EF94CB734B}"/>
-              </a:ext>
-              <a:ext uri="{C183D7F6-B498-43B3-948B-1728B52AA6E4}">
-                <adec:decorative xmlns:adec="http://schemas.microsoft.com/office/drawing/2017/decorative" val="1"/>
-              </a:ext>
-            </a:extLst>
-          </p:cNvPr>
-          <p:cNvCxnSpPr>
-            <a:cxnSpLocks noGrp="1" noRot="1" noChangeAspect="1" noMove="1" noResize="1" noEditPoints="1" noAdjustHandles="1" noChangeArrowheads="1" noChangeShapeType="1"/>
-          </p:cNvCxnSpPr>
-          <p:nvPr>
-            <p:extLst>
-              <p:ext uri="{386F3935-93C4-4BCD-93E2-E3B085C9AB24}">
-                <p16:designElem xmlns:p16="http://schemas.microsoft.com/office/powerpoint/2015/main" val="1"/>
-              </p:ext>
-            </p:extLst>
-          </p:nvPr>
-        </p:nvCxnSpPr>
-        <p:spPr>
-          <a:xfrm>
-            <a:off x="9480331" y="5123793"/>
-            <a:ext cx="935420" cy="0"/>
-          </a:xfrm>
-          <a:prstGeom prst="line">
-            <a:avLst/>
-          </a:prstGeom>
-          <a:ln w="25400" cap="sq">
-            <a:solidFill>
-              <a:schemeClr val="tx1">
-                <a:lumMod val="85000"/>
-                <a:lumOff val="15000"/>
-              </a:schemeClr>
-            </a:solidFill>
-            <a:bevel/>
-          </a:ln>
-        </p:spPr>
-        <p:style>
-          <a:lnRef idx="1">
-            <a:schemeClr val="accent1"/>
-          </a:lnRef>
-          <a:fillRef idx="0">
-            <a:schemeClr val="accent1"/>
-          </a:fillRef>
-          <a:effectRef idx="0">
-            <a:schemeClr val="accent1"/>
-          </a:effectRef>
-          <a:fontRef idx="minor">
-            <a:schemeClr val="tx1"/>
-          </a:fontRef>
-        </p:style>
-      </p:cxnSp>
-    </p:spTree>
-    <p:extLst>
-      <p:ext uri="{BB962C8B-B14F-4D97-AF65-F5344CB8AC3E}">
-        <p14:creationId xmlns:p14="http://schemas.microsoft.com/office/powerpoint/2010/main" val="4032790210"/>
-      </p:ext>
-    </p:extLst>
-  </p:cSld>
-  <p:clrMapOvr>
-    <a:masterClrMapping/>
-  </p:clrMapOvr>
-</p:sld>
-</file>
-
-<file path=ppt/slides/slide19.xml><?xml version="1.0" encoding="utf-8"?>
-<p:sld xmlns:a="http://schemas.openxmlformats.org/drawingml/2006/main" xmlns:r="http://schemas.openxmlformats.org/officeDocument/2006/relationships" xmlns:p="http://schemas.openxmlformats.org/presentationml/2006/main">
-  <p:cSld>
-    <p:spTree>
-      <p:nvGrpSpPr>
-        <p:cNvPr id="1" name=""/>
-        <p:cNvGrpSpPr/>
-        <p:nvPr/>
-      </p:nvGrpSpPr>
-      <p:grpSpPr>
-        <a:xfrm>
-          <a:off x="0" y="0"/>
-          <a:ext cx="0" cy="0"/>
-          <a:chOff x="0" y="0"/>
-          <a:chExt cx="0" cy="0"/>
-        </a:xfrm>
-      </p:grpSpPr>
-      <p:sp>
-        <p:nvSpPr>
-          <p:cNvPr id="2" name="Titel 1">
-            <a:extLst>
-              <a:ext uri="{FF2B5EF4-FFF2-40B4-BE49-F238E27FC236}">
-                <a16:creationId xmlns:a16="http://schemas.microsoft.com/office/drawing/2014/main" id="{5A50AE3B-CD8C-487A-B223-DC13D595B226}"/>
-              </a:ext>
-            </a:extLst>
-          </p:cNvPr>
-          <p:cNvSpPr>
-            <a:spLocks noGrp="1"/>
-          </p:cNvSpPr>
-          <p:nvPr>
-            <p:ph type="title"/>
-          </p:nvPr>
-        </p:nvSpPr>
-        <p:spPr/>
-        <p:txBody>
-          <a:bodyPr/>
-          <a:lstStyle/>
-          <a:p>
-            <a:r>
-              <a:rPr lang="nl-BE" dirty="0"/>
-              <a:t>Breakpoint zetten</a:t>
-            </a:r>
-          </a:p>
-        </p:txBody>
-      </p:sp>
-      <p:pic>
-        <p:nvPicPr>
-          <p:cNvPr id="6" name="Tijdelijke aanduiding voor inhoud 5" descr="Afbeelding met computer&#10;&#10;Automatisch gegenereerde beschrijving">
-            <a:extLst>
-              <a:ext uri="{FF2B5EF4-FFF2-40B4-BE49-F238E27FC236}">
-                <a16:creationId xmlns:a16="http://schemas.microsoft.com/office/drawing/2014/main" id="{9BA92AC2-AB1C-4304-AF37-ECFA8750F0B6}"/>
-              </a:ext>
-            </a:extLst>
-          </p:cNvPr>
-          <p:cNvPicPr>
-            <a:picLocks noGrp="1" noChangeAspect="1"/>
-          </p:cNvPicPr>
-          <p:nvPr>
-            <p:ph idx="1"/>
-          </p:nvPr>
-        </p:nvPicPr>
-        <p:blipFill>
-          <a:blip r:embed="rId2">
-            <a:extLst>
-              <a:ext uri="{28A0092B-C50C-407E-A947-70E740481C1C}">
-                <a14:useLocalDpi xmlns:a14="http://schemas.microsoft.com/office/drawing/2010/main" val="0"/>
-              </a:ext>
-            </a:extLst>
-          </a:blip>
-          <a:stretch>
-            <a:fillRect/>
-          </a:stretch>
-        </p:blipFill>
-        <p:spPr>
-          <a:xfrm>
-            <a:off x="1055440" y="1397259"/>
-            <a:ext cx="10657184" cy="4664593"/>
-          </a:xfrm>
-        </p:spPr>
-      </p:pic>
-      <p:sp>
-        <p:nvSpPr>
-          <p:cNvPr id="4" name="Tijdelijke aanduiding voor dianummer 3">
-            <a:extLst>
-              <a:ext uri="{FF2B5EF4-FFF2-40B4-BE49-F238E27FC236}">
-                <a16:creationId xmlns:a16="http://schemas.microsoft.com/office/drawing/2014/main" id="{1A9322CF-FA21-4DAF-90BA-610C0617927A}"/>
-              </a:ext>
-            </a:extLst>
-          </p:cNvPr>
-          <p:cNvSpPr>
-            <a:spLocks noGrp="1"/>
-          </p:cNvSpPr>
-          <p:nvPr>
-            <p:ph type="sldNum" sz="quarter" idx="12"/>
-          </p:nvPr>
-        </p:nvSpPr>
-        <p:spPr/>
-        <p:txBody>
-          <a:bodyPr/>
-          <a:lstStyle/>
-          <a:p>
-            <a:fld id="{E8A62353-F7CD-46ED-8877-B27D0E33FCF8}" type="slidenum">
-              <a:rPr lang="nl-BE" smtClean="0"/>
-              <a:t>19</a:t>
-            </a:fld>
-            <a:endParaRPr lang="nl-BE"/>
-          </a:p>
-        </p:txBody>
-      </p:sp>
-      <p:sp>
-        <p:nvSpPr>
-          <p:cNvPr id="7" name="Tekstvak 6">
-            <a:extLst>
-              <a:ext uri="{FF2B5EF4-FFF2-40B4-BE49-F238E27FC236}">
-                <a16:creationId xmlns:a16="http://schemas.microsoft.com/office/drawing/2014/main" id="{9C1FE827-7E66-4432-A86D-F2E34D343B88}"/>
-              </a:ext>
-            </a:extLst>
-          </p:cNvPr>
-          <p:cNvSpPr txBox="1"/>
-          <p:nvPr/>
-        </p:nvSpPr>
-        <p:spPr>
-          <a:xfrm>
-            <a:off x="8610600" y="64612"/>
-            <a:ext cx="3816424" cy="1200329"/>
-          </a:xfrm>
-          <a:prstGeom prst="rect">
-            <a:avLst/>
-          </a:prstGeom>
-          <a:noFill/>
-        </p:spPr>
-        <p:txBody>
-          <a:bodyPr wrap="square" rtlCol="0">
-            <a:spAutoFit/>
-          </a:bodyPr>
-          <a:lstStyle/>
-          <a:p>
-            <a:r>
-              <a:rPr lang="nl-BE" dirty="0"/>
-              <a:t>Breakpoint: uitvoer zal op dit punt, VOOR deze lijn, ‘pauzeren’ en naar Visual Code gaan</a:t>
-            </a:r>
-          </a:p>
-          <a:p>
-            <a:r>
-              <a:rPr lang="nl-BE" dirty="0"/>
-              <a:t>Meerdere breakpoints toegelaten</a:t>
-            </a:r>
-          </a:p>
-        </p:txBody>
-      </p:sp>
-      <p:sp>
-        <p:nvSpPr>
-          <p:cNvPr id="8" name="Rechthoek 7">
-            <a:extLst>
-              <a:ext uri="{FF2B5EF4-FFF2-40B4-BE49-F238E27FC236}">
-                <a16:creationId xmlns:a16="http://schemas.microsoft.com/office/drawing/2014/main" id="{F55B6DAB-B78B-46A1-8C95-8CC11F092E82}"/>
-              </a:ext>
-            </a:extLst>
-          </p:cNvPr>
-          <p:cNvSpPr/>
-          <p:nvPr/>
-        </p:nvSpPr>
-        <p:spPr>
-          <a:xfrm>
-            <a:off x="191344" y="6169709"/>
-            <a:ext cx="12097344" cy="646331"/>
-          </a:xfrm>
-          <a:prstGeom prst="rect">
-            <a:avLst/>
-          </a:prstGeom>
-        </p:spPr>
-        <p:txBody>
-          <a:bodyPr wrap="square">
-            <a:spAutoFit/>
-          </a:bodyPr>
-          <a:lstStyle/>
-          <a:p>
-            <a:r>
-              <a:rPr lang="nl-BE" dirty="0"/>
-              <a:t>Bekijk je deze slides in pdf? De </a:t>
-            </a:r>
-            <a:r>
-              <a:rPr lang="nl-BE" dirty="0" err="1"/>
-              <a:t>animated</a:t>
-            </a:r>
-            <a:r>
-              <a:rPr lang="nl-BE" dirty="0"/>
-              <a:t> </a:t>
-            </a:r>
-            <a:r>
-              <a:rPr lang="nl-BE" dirty="0" err="1"/>
-              <a:t>gifs</a:t>
-            </a:r>
-            <a:r>
-              <a:rPr lang="nl-BE" dirty="0"/>
-              <a:t> in deze en volgende slides kan je hier in beweging zien </a:t>
-            </a:r>
-            <a:r>
-              <a:rPr lang="nl-BE" dirty="0">
-                <a:hlinkClick r:id="rId3"/>
-              </a:rPr>
-              <a:t>https://tutorials.visualstudio.com/vs-get-started/debugging</a:t>
-            </a:r>
-            <a:r>
-              <a:rPr lang="nl-BE" dirty="0"/>
-              <a:t> </a:t>
-            </a:r>
-          </a:p>
-        </p:txBody>
-      </p:sp>
-    </p:spTree>
-    <p:extLst>
-      <p:ext uri="{BB962C8B-B14F-4D97-AF65-F5344CB8AC3E}">
-        <p14:creationId xmlns:p14="http://schemas.microsoft.com/office/powerpoint/2010/main" val="2589707901"/>
-      </p:ext>
-    </p:extLst>
-  </p:cSld>
-  <p:clrMapOvr>
-    <a:masterClrMapping/>
-  </p:clrMapOvr>
-</p:sld>
-</file>
-
 <file path=ppt/slides/slide2.xml><?xml version="1.0" encoding="utf-8"?>
 <p:sld xmlns:a="http://schemas.openxmlformats.org/drawingml/2006/main" xmlns:r="http://schemas.openxmlformats.org/officeDocument/2006/relationships" xmlns:p="http://schemas.openxmlformats.org/presentationml/2006/main">
   <p:cSld>
@@ -12483,539 +11867,6 @@
     <p:extLst>
       <p:ext uri="{BB962C8B-B14F-4D97-AF65-F5344CB8AC3E}">
         <p14:creationId xmlns:p14="http://schemas.microsoft.com/office/powerpoint/2010/main" val="339713281"/>
-      </p:ext>
-    </p:extLst>
-  </p:cSld>
-  <p:clrMapOvr>
-    <a:masterClrMapping/>
-  </p:clrMapOvr>
-</p:sld>
-</file>
-
-<file path=ppt/slides/slide20.xml><?xml version="1.0" encoding="utf-8"?>
-<p:sld xmlns:a="http://schemas.openxmlformats.org/drawingml/2006/main" xmlns:r="http://schemas.openxmlformats.org/officeDocument/2006/relationships" xmlns:p="http://schemas.openxmlformats.org/presentationml/2006/main">
-  <p:cSld>
-    <p:spTree>
-      <p:nvGrpSpPr>
-        <p:cNvPr id="1" name=""/>
-        <p:cNvGrpSpPr/>
-        <p:nvPr/>
-      </p:nvGrpSpPr>
-      <p:grpSpPr>
-        <a:xfrm>
-          <a:off x="0" y="0"/>
-          <a:ext cx="0" cy="0"/>
-          <a:chOff x="0" y="0"/>
-          <a:chExt cx="0" cy="0"/>
-        </a:xfrm>
-      </p:grpSpPr>
-      <p:sp>
-        <p:nvSpPr>
-          <p:cNvPr id="2" name="Titel 1">
-            <a:extLst>
-              <a:ext uri="{FF2B5EF4-FFF2-40B4-BE49-F238E27FC236}">
-                <a16:creationId xmlns:a16="http://schemas.microsoft.com/office/drawing/2014/main" id="{E51EA0B0-0151-4FAB-B657-C6224C5FB304}"/>
-              </a:ext>
-            </a:extLst>
-          </p:cNvPr>
-          <p:cNvSpPr>
-            <a:spLocks noGrp="1"/>
-          </p:cNvSpPr>
-          <p:nvPr>
-            <p:ph type="title"/>
-          </p:nvPr>
-        </p:nvSpPr>
-        <p:spPr/>
-        <p:txBody>
-          <a:bodyPr/>
-          <a:lstStyle/>
-          <a:p>
-            <a:r>
-              <a:rPr lang="nl-BE" dirty="0"/>
-              <a:t>Debugger starten</a:t>
-            </a:r>
-          </a:p>
-        </p:txBody>
-      </p:sp>
-      <p:pic>
-        <p:nvPicPr>
-          <p:cNvPr id="6" name="Tijdelijke aanduiding voor inhoud 5" descr="Afbeelding met schermafbeelding, monitor, telefoon, computer&#10;&#10;Automatisch gegenereerde beschrijving">
-            <a:extLst>
-              <a:ext uri="{FF2B5EF4-FFF2-40B4-BE49-F238E27FC236}">
-                <a16:creationId xmlns:a16="http://schemas.microsoft.com/office/drawing/2014/main" id="{EDC7BEAD-043F-49B7-82DF-CB0BC71C2BF6}"/>
-              </a:ext>
-            </a:extLst>
-          </p:cNvPr>
-          <p:cNvPicPr>
-            <a:picLocks noGrp="1" noChangeAspect="1"/>
-          </p:cNvPicPr>
-          <p:nvPr>
-            <p:ph idx="1"/>
-          </p:nvPr>
-        </p:nvPicPr>
-        <p:blipFill>
-          <a:blip r:embed="rId2" cstate="print">
-            <a:extLst>
-              <a:ext uri="{28A0092B-C50C-407E-A947-70E740481C1C}">
-                <a14:useLocalDpi xmlns:a14="http://schemas.microsoft.com/office/drawing/2010/main" val="0"/>
-              </a:ext>
-            </a:extLst>
-          </a:blip>
-          <a:stretch>
-            <a:fillRect/>
-          </a:stretch>
-        </p:blipFill>
-        <p:spPr>
-          <a:xfrm>
-            <a:off x="983432" y="1412776"/>
-            <a:ext cx="9361040" cy="5265585"/>
-          </a:xfrm>
-        </p:spPr>
-      </p:pic>
-      <p:sp>
-        <p:nvSpPr>
-          <p:cNvPr id="4" name="Tijdelijke aanduiding voor dianummer 3">
-            <a:extLst>
-              <a:ext uri="{FF2B5EF4-FFF2-40B4-BE49-F238E27FC236}">
-                <a16:creationId xmlns:a16="http://schemas.microsoft.com/office/drawing/2014/main" id="{4C3BD259-151B-48CE-9CB2-00B9933E6EB3}"/>
-              </a:ext>
-            </a:extLst>
-          </p:cNvPr>
-          <p:cNvSpPr>
-            <a:spLocks noGrp="1"/>
-          </p:cNvSpPr>
-          <p:nvPr>
-            <p:ph type="sldNum" sz="quarter" idx="12"/>
-          </p:nvPr>
-        </p:nvSpPr>
-        <p:spPr/>
-        <p:txBody>
-          <a:bodyPr/>
-          <a:lstStyle/>
-          <a:p>
-            <a:fld id="{E8A62353-F7CD-46ED-8877-B27D0E33FCF8}" type="slidenum">
-              <a:rPr lang="nl-BE" smtClean="0"/>
-              <a:t>20</a:t>
-            </a:fld>
-            <a:endParaRPr lang="nl-BE"/>
-          </a:p>
-        </p:txBody>
-      </p:sp>
-    </p:spTree>
-    <p:extLst>
-      <p:ext uri="{BB962C8B-B14F-4D97-AF65-F5344CB8AC3E}">
-        <p14:creationId xmlns:p14="http://schemas.microsoft.com/office/powerpoint/2010/main" val="817521914"/>
-      </p:ext>
-    </p:extLst>
-  </p:cSld>
-  <p:clrMapOvr>
-    <a:masterClrMapping/>
-  </p:clrMapOvr>
-</p:sld>
-</file>
-
-<file path=ppt/slides/slide21.xml><?xml version="1.0" encoding="utf-8"?>
-<p:sld xmlns:a="http://schemas.openxmlformats.org/drawingml/2006/main" xmlns:r="http://schemas.openxmlformats.org/officeDocument/2006/relationships" xmlns:p="http://schemas.openxmlformats.org/presentationml/2006/main">
-  <p:cSld>
-    <p:spTree>
-      <p:nvGrpSpPr>
-        <p:cNvPr id="1" name=""/>
-        <p:cNvGrpSpPr/>
-        <p:nvPr/>
-      </p:nvGrpSpPr>
-      <p:grpSpPr>
-        <a:xfrm>
-          <a:off x="0" y="0"/>
-          <a:ext cx="0" cy="0"/>
-          <a:chOff x="0" y="0"/>
-          <a:chExt cx="0" cy="0"/>
-        </a:xfrm>
-      </p:grpSpPr>
-      <p:sp>
-        <p:nvSpPr>
-          <p:cNvPr id="2" name="Titel 1">
-            <a:extLst>
-              <a:ext uri="{FF2B5EF4-FFF2-40B4-BE49-F238E27FC236}">
-                <a16:creationId xmlns:a16="http://schemas.microsoft.com/office/drawing/2014/main" id="{1D4CF905-D01F-4607-B39A-68E5F7B3B04C}"/>
-              </a:ext>
-            </a:extLst>
-          </p:cNvPr>
-          <p:cNvSpPr>
-            <a:spLocks noGrp="1"/>
-          </p:cNvSpPr>
-          <p:nvPr>
-            <p:ph type="title"/>
-          </p:nvPr>
-        </p:nvSpPr>
-        <p:spPr/>
-        <p:txBody>
-          <a:bodyPr/>
-          <a:lstStyle/>
-          <a:p>
-            <a:r>
-              <a:rPr lang="nl-BE" dirty="0"/>
-              <a:t>Watch (</a:t>
-            </a:r>
-            <a:r>
-              <a:rPr lang="nl-BE" dirty="0" err="1"/>
-              <a:t>autos</a:t>
-            </a:r>
-            <a:r>
-              <a:rPr lang="nl-BE" dirty="0"/>
-              <a:t>) venster observeren</a:t>
-            </a:r>
-          </a:p>
-        </p:txBody>
-      </p:sp>
-      <p:pic>
-        <p:nvPicPr>
-          <p:cNvPr id="6" name="Tijdelijke aanduiding voor inhoud 5" descr="Afbeelding met schermafbeelding, monitor, zwart, scherm&#10;&#10;Automatisch gegenereerde beschrijving">
-            <a:extLst>
-              <a:ext uri="{FF2B5EF4-FFF2-40B4-BE49-F238E27FC236}">
-                <a16:creationId xmlns:a16="http://schemas.microsoft.com/office/drawing/2014/main" id="{C4AF7B38-A232-47AC-B257-A87C2D30AE58}"/>
-              </a:ext>
-            </a:extLst>
-          </p:cNvPr>
-          <p:cNvPicPr>
-            <a:picLocks noGrp="1" noChangeAspect="1"/>
-          </p:cNvPicPr>
-          <p:nvPr>
-            <p:ph idx="1"/>
-          </p:nvPr>
-        </p:nvPicPr>
-        <p:blipFill>
-          <a:blip r:embed="rId2">
-            <a:extLst>
-              <a:ext uri="{28A0092B-C50C-407E-A947-70E740481C1C}">
-                <a14:useLocalDpi xmlns:a14="http://schemas.microsoft.com/office/drawing/2010/main" val="0"/>
-              </a:ext>
-            </a:extLst>
-          </a:blip>
-          <a:stretch>
-            <a:fillRect/>
-          </a:stretch>
-        </p:blipFill>
-        <p:spPr>
-          <a:xfrm>
-            <a:off x="1845296" y="1412776"/>
-            <a:ext cx="8136904" cy="5556751"/>
-          </a:xfrm>
-        </p:spPr>
-      </p:pic>
-      <p:sp>
-        <p:nvSpPr>
-          <p:cNvPr id="4" name="Tijdelijke aanduiding voor dianummer 3">
-            <a:extLst>
-              <a:ext uri="{FF2B5EF4-FFF2-40B4-BE49-F238E27FC236}">
-                <a16:creationId xmlns:a16="http://schemas.microsoft.com/office/drawing/2014/main" id="{4C29D414-46F4-4281-A461-FAF009790149}"/>
-              </a:ext>
-            </a:extLst>
-          </p:cNvPr>
-          <p:cNvSpPr>
-            <a:spLocks noGrp="1"/>
-          </p:cNvSpPr>
-          <p:nvPr>
-            <p:ph type="sldNum" sz="quarter" idx="12"/>
-          </p:nvPr>
-        </p:nvSpPr>
-        <p:spPr/>
-        <p:txBody>
-          <a:bodyPr/>
-          <a:lstStyle/>
-          <a:p>
-            <a:fld id="{E8A62353-F7CD-46ED-8877-B27D0E33FCF8}" type="slidenum">
-              <a:rPr lang="nl-BE" smtClean="0"/>
-              <a:t>21</a:t>
-            </a:fld>
-            <a:endParaRPr lang="nl-BE"/>
-          </a:p>
-        </p:txBody>
-      </p:sp>
-    </p:spTree>
-    <p:extLst>
-      <p:ext uri="{BB962C8B-B14F-4D97-AF65-F5344CB8AC3E}">
-        <p14:creationId xmlns:p14="http://schemas.microsoft.com/office/powerpoint/2010/main" val="4206182101"/>
-      </p:ext>
-    </p:extLst>
-  </p:cSld>
-  <p:clrMapOvr>
-    <a:masterClrMapping/>
-  </p:clrMapOvr>
-</p:sld>
-</file>
-
-<file path=ppt/slides/slide22.xml><?xml version="1.0" encoding="utf-8"?>
-<p:sld xmlns:a="http://schemas.openxmlformats.org/drawingml/2006/main" xmlns:r="http://schemas.openxmlformats.org/officeDocument/2006/relationships" xmlns:p="http://schemas.openxmlformats.org/presentationml/2006/main">
-  <p:cSld>
-    <p:spTree>
-      <p:nvGrpSpPr>
-        <p:cNvPr id="1" name=""/>
-        <p:cNvGrpSpPr/>
-        <p:nvPr/>
-      </p:nvGrpSpPr>
-      <p:grpSpPr>
-        <a:xfrm>
-          <a:off x="0" y="0"/>
-          <a:ext cx="0" cy="0"/>
-          <a:chOff x="0" y="0"/>
-          <a:chExt cx="0" cy="0"/>
-        </a:xfrm>
-      </p:grpSpPr>
-      <p:pic>
-        <p:nvPicPr>
-          <p:cNvPr id="6" name="Tijdelijke aanduiding voor inhoud 5" descr="Afbeelding met zwart, schermafbeelding, scherm, monitor&#10;&#10;Automatisch gegenereerde beschrijving">
-            <a:extLst>
-              <a:ext uri="{FF2B5EF4-FFF2-40B4-BE49-F238E27FC236}">
-                <a16:creationId xmlns:a16="http://schemas.microsoft.com/office/drawing/2014/main" id="{EF6316A1-9C6A-4035-B9AC-DCBB234565F5}"/>
-              </a:ext>
-            </a:extLst>
-          </p:cNvPr>
-          <p:cNvPicPr>
-            <a:picLocks noGrp="1" noChangeAspect="1"/>
-          </p:cNvPicPr>
-          <p:nvPr>
-            <p:ph idx="1"/>
-          </p:nvPr>
-        </p:nvPicPr>
-        <p:blipFill>
-          <a:blip r:embed="rId2">
-            <a:extLst>
-              <a:ext uri="{28A0092B-C50C-407E-A947-70E740481C1C}">
-                <a14:useLocalDpi xmlns:a14="http://schemas.microsoft.com/office/drawing/2010/main" val="0"/>
-              </a:ext>
-            </a:extLst>
-          </a:blip>
-          <a:stretch>
-            <a:fillRect/>
-          </a:stretch>
-        </p:blipFill>
-        <p:spPr>
-          <a:xfrm>
-            <a:off x="85681" y="2492896"/>
-            <a:ext cx="6010319" cy="2371742"/>
-          </a:xfrm>
-        </p:spPr>
-      </p:pic>
-      <p:pic>
-        <p:nvPicPr>
-          <p:cNvPr id="7" name="Afbeelding 6">
-            <a:extLst>
-              <a:ext uri="{FF2B5EF4-FFF2-40B4-BE49-F238E27FC236}">
-                <a16:creationId xmlns:a16="http://schemas.microsoft.com/office/drawing/2014/main" id="{4995F6BE-BF0F-45A6-A0E1-E8769C2F0ED9}"/>
-              </a:ext>
-            </a:extLst>
-          </p:cNvPr>
-          <p:cNvPicPr>
-            <a:picLocks noChangeAspect="1"/>
-          </p:cNvPicPr>
-          <p:nvPr/>
-        </p:nvPicPr>
-        <p:blipFill>
-          <a:blip r:embed="rId3"/>
-          <a:stretch>
-            <a:fillRect/>
-          </a:stretch>
-        </p:blipFill>
-        <p:spPr>
-          <a:xfrm>
-            <a:off x="5519936" y="2016832"/>
-            <a:ext cx="6514462" cy="4013374"/>
-          </a:xfrm>
-          <a:prstGeom prst="rect">
-            <a:avLst/>
-          </a:prstGeom>
-        </p:spPr>
-      </p:pic>
-      <p:sp>
-        <p:nvSpPr>
-          <p:cNvPr id="2" name="Titel 1">
-            <a:extLst>
-              <a:ext uri="{FF2B5EF4-FFF2-40B4-BE49-F238E27FC236}">
-                <a16:creationId xmlns:a16="http://schemas.microsoft.com/office/drawing/2014/main" id="{4006C287-1C0A-4C66-B02B-0625335F0428}"/>
-              </a:ext>
-            </a:extLst>
-          </p:cNvPr>
-          <p:cNvSpPr>
-            <a:spLocks noGrp="1"/>
-          </p:cNvSpPr>
-          <p:nvPr>
-            <p:ph type="title"/>
-          </p:nvPr>
-        </p:nvSpPr>
-        <p:spPr/>
-        <p:txBody>
-          <a:bodyPr/>
-          <a:lstStyle/>
-          <a:p>
-            <a:r>
-              <a:rPr lang="nl-BE" dirty="0"/>
-              <a:t>Doorheen code ‘steppen’</a:t>
-            </a:r>
-          </a:p>
-        </p:txBody>
-      </p:sp>
-      <p:sp>
-        <p:nvSpPr>
-          <p:cNvPr id="4" name="Tijdelijke aanduiding voor dianummer 3">
-            <a:extLst>
-              <a:ext uri="{FF2B5EF4-FFF2-40B4-BE49-F238E27FC236}">
-                <a16:creationId xmlns:a16="http://schemas.microsoft.com/office/drawing/2014/main" id="{F6DF4A32-6DCD-4A7D-AAFC-32AB7461BC1A}"/>
-              </a:ext>
-            </a:extLst>
-          </p:cNvPr>
-          <p:cNvSpPr>
-            <a:spLocks noGrp="1"/>
-          </p:cNvSpPr>
-          <p:nvPr>
-            <p:ph type="sldNum" sz="quarter" idx="12"/>
-          </p:nvPr>
-        </p:nvSpPr>
-        <p:spPr/>
-        <p:txBody>
-          <a:bodyPr/>
-          <a:lstStyle/>
-          <a:p>
-            <a:fld id="{E8A62353-F7CD-46ED-8877-B27D0E33FCF8}" type="slidenum">
-              <a:rPr lang="nl-BE" smtClean="0"/>
-              <a:t>22</a:t>
-            </a:fld>
-            <a:endParaRPr lang="nl-BE"/>
-          </a:p>
-        </p:txBody>
-      </p:sp>
-    </p:spTree>
-    <p:extLst>
-      <p:ext uri="{BB962C8B-B14F-4D97-AF65-F5344CB8AC3E}">
-        <p14:creationId xmlns:p14="http://schemas.microsoft.com/office/powerpoint/2010/main" val="1902369608"/>
-      </p:ext>
-    </p:extLst>
-  </p:cSld>
-  <p:clrMapOvr>
-    <a:masterClrMapping/>
-  </p:clrMapOvr>
-</p:sld>
-</file>
-
-<file path=ppt/slides/slide23.xml><?xml version="1.0" encoding="utf-8"?>
-<p:sld xmlns:a="http://schemas.openxmlformats.org/drawingml/2006/main" xmlns:r="http://schemas.openxmlformats.org/officeDocument/2006/relationships" xmlns:p="http://schemas.openxmlformats.org/presentationml/2006/main">
-  <p:cSld>
-    <p:bg>
-      <p:bgPr>
-        <a:solidFill>
-          <a:schemeClr val="bg1"/>
-        </a:solidFill>
-        <a:effectLst/>
-      </p:bgPr>
-    </p:bg>
-    <p:spTree>
-      <p:nvGrpSpPr>
-        <p:cNvPr id="1" name=""/>
-        <p:cNvGrpSpPr/>
-        <p:nvPr/>
-      </p:nvGrpSpPr>
-      <p:grpSpPr>
-        <a:xfrm>
-          <a:off x="0" y="0"/>
-          <a:ext cx="0" cy="0"/>
-          <a:chOff x="0" y="0"/>
-          <a:chExt cx="0" cy="0"/>
-        </a:xfrm>
-      </p:grpSpPr>
-      <p:pic>
-        <p:nvPicPr>
-          <p:cNvPr id="6" name="Tijdelijke aanduiding voor inhoud 5" descr="Afbeelding met tekening, teken&#10;&#10;Automatisch gegenereerde beschrijving">
-            <a:extLst>
-              <a:ext uri="{FF2B5EF4-FFF2-40B4-BE49-F238E27FC236}">
-                <a16:creationId xmlns:a16="http://schemas.microsoft.com/office/drawing/2014/main" id="{993A6A86-1722-4A60-A73D-3D2BACF0AF72}"/>
-              </a:ext>
-            </a:extLst>
-          </p:cNvPr>
-          <p:cNvPicPr>
-            <a:picLocks noGrp="1" noChangeAspect="1"/>
-          </p:cNvPicPr>
-          <p:nvPr>
-            <p:ph idx="1"/>
-          </p:nvPr>
-        </p:nvPicPr>
-        <p:blipFill rotWithShape="1">
-          <a:blip r:embed="rId2">
-            <a:extLst>
-              <a:ext uri="{28A0092B-C50C-407E-A947-70E740481C1C}">
-                <a14:useLocalDpi xmlns:a14="http://schemas.microsoft.com/office/drawing/2010/main" val="0"/>
-              </a:ext>
-            </a:extLst>
-          </a:blip>
-          <a:srcRect t="1240" b="76"/>
-          <a:stretch/>
-        </p:blipFill>
-        <p:spPr>
-          <a:xfrm>
-            <a:off x="20" y="10"/>
-            <a:ext cx="12191980" cy="6857990"/>
-          </a:xfrm>
-          <a:prstGeom prst="rect">
-            <a:avLst/>
-          </a:prstGeom>
-        </p:spPr>
-      </p:pic>
-      <p:sp>
-        <p:nvSpPr>
-          <p:cNvPr id="4" name="Tijdelijke aanduiding voor dianummer 3">
-            <a:extLst>
-              <a:ext uri="{FF2B5EF4-FFF2-40B4-BE49-F238E27FC236}">
-                <a16:creationId xmlns:a16="http://schemas.microsoft.com/office/drawing/2014/main" id="{5A52AFBD-7A2A-4CD8-9CA6-E0FE52A4734B}"/>
-              </a:ext>
-            </a:extLst>
-          </p:cNvPr>
-          <p:cNvSpPr>
-            <a:spLocks noGrp="1"/>
-          </p:cNvSpPr>
-          <p:nvPr>
-            <p:ph type="sldNum" sz="quarter" idx="12"/>
-          </p:nvPr>
-        </p:nvSpPr>
-        <p:spPr>
-          <a:xfrm>
-            <a:off x="8610600" y="6356350"/>
-            <a:ext cx="2743200" cy="365125"/>
-          </a:xfrm>
-        </p:spPr>
-        <p:txBody>
-          <a:bodyPr vert="horz" lIns="91440" tIns="45720" rIns="91440" bIns="45720" rtlCol="0" anchor="ctr">
-            <a:normAutofit/>
-          </a:bodyPr>
-          <a:lstStyle/>
-          <a:p>
-            <a:pPr>
-              <a:spcAft>
-                <a:spcPts val="600"/>
-              </a:spcAft>
-            </a:pPr>
-            <a:fld id="{E8A62353-F7CD-46ED-8877-B27D0E33FCF8}" type="slidenum">
-              <a:rPr lang="en-US">
-                <a:solidFill>
-                  <a:srgbClr val="FFFFFF"/>
-                </a:solidFill>
-              </a:rPr>
-              <a:pPr>
-                <a:spcAft>
-                  <a:spcPts val="600"/>
-                </a:spcAft>
-              </a:pPr>
-              <a:t>23</a:t>
-            </a:fld>
-            <a:endParaRPr lang="en-US">
-              <a:solidFill>
-                <a:srgbClr val="FFFFFF"/>
-              </a:solidFill>
-            </a:endParaRPr>
-          </a:p>
-        </p:txBody>
-      </p:sp>
-    </p:spTree>
-    <p:extLst>
-      <p:ext uri="{BB962C8B-B14F-4D97-AF65-F5344CB8AC3E}">
-        <p14:creationId xmlns:p14="http://schemas.microsoft.com/office/powerpoint/2010/main" val="804954993"/>
       </p:ext>
     </p:extLst>
   </p:cSld>

</xml_diff>